<commit_message>
Slides for part1-3 are completely done
</commit_message>
<xml_diff>
--- a/templates/HPP_Template.pptx
+++ b/templates/HPP_Template.pptx
@@ -9209,7 +9209,7 @@
           <a:p>
             <a:fld id="{C17F2C1D-F243-42AB-ADF2-E7CB4E04900E}" type="datetimeFigureOut">
               <a:rPr lang="en-US" smtClean="0"/>
-              <a:t>11/13/2022</a:t>
+              <a:t>11/22/2022</a:t>
             </a:fld>
             <a:endParaRPr lang="en-US"/>
           </a:p>
@@ -9386,7 +9386,7 @@
           <a:p>
             <a:fld id="{020CE34E-5667-4A32-A6BA-10C7A552BC63}" type="datetimeFigureOut">
               <a:rPr lang="en-US" smtClean="0"/>
-              <a:t>11/13/2022</a:t>
+              <a:t>11/22/2022</a:t>
             </a:fld>
             <a:endParaRPr lang="en-US"/>
           </a:p>
@@ -22477,13 +22477,13 @@
   <p:clrMapOvr>
     <a:masterClrMapping/>
   </p:clrMapOvr>
-  <mc:AlternateContent xmlns:mc="http://schemas.openxmlformats.org/markup-compatibility/2006">
-    <mc:Choice xmlns:p159="http://schemas.microsoft.com/office/powerpoint/2015/09/main" Requires="p159">
+  <mc:AlternateContent xmlns:mc="http://schemas.openxmlformats.org/markup-compatibility/2006" xmlns:p159="http://schemas.microsoft.com/office/powerpoint/2015/09/main">
+    <mc:Choice Requires="p159">
       <p:transition xmlns:p14="http://schemas.microsoft.com/office/powerpoint/2010/main" spd="slow" p14:dur="2000">
         <p159:morph option="byChar"/>
       </p:transition>
     </mc:Choice>
-    <mc:Fallback>
+    <mc:Fallback xmlns="">
       <p:transition spd="slow">
         <p:fade/>
       </p:transition>
@@ -22614,40 +22614,6 @@
           </a:xfrm>
         </p:spPr>
       </p:pic>
-      <p:sp>
-        <p:nvSpPr>
-          <p:cNvPr id="19" name="Date Placeholder 18">
-            <a:extLst>
-              <a:ext uri="{FF2B5EF4-FFF2-40B4-BE49-F238E27FC236}">
-                <a16:creationId xmlns:a16="http://schemas.microsoft.com/office/drawing/2014/main" id="{386DB667-0553-4FB8-B0E0-776539934AFF}"/>
-              </a:ext>
-            </a:extLst>
-          </p:cNvPr>
-          <p:cNvSpPr>
-            <a:spLocks noGrp="1"/>
-          </p:cNvSpPr>
-          <p:nvPr>
-            <p:ph type="dt" sz="half" idx="10"/>
-          </p:nvPr>
-        </p:nvSpPr>
-        <p:spPr>
-          <a:xfrm>
-            <a:off x="550863" y="6507212"/>
-            <a:ext cx="2628900" cy="153888"/>
-          </a:xfrm>
-        </p:spPr>
-        <p:txBody>
-          <a:bodyPr/>
-          <a:lstStyle/>
-          <a:p>
-            <a:r>
-              <a:rPr lang="en-US"/>
-              <a:t>Tuesday, February 2, 20XX</a:t>
-            </a:r>
-            <a:endParaRPr lang="en-US" dirty="0"/>
-          </a:p>
-        </p:txBody>
-      </p:sp>
       <p:sp>
         <p:nvSpPr>
           <p:cNvPr id="20" name="Footer Placeholder 19">
@@ -23193,40 +23159,6 @@
       </p:sp>
       <p:sp>
         <p:nvSpPr>
-          <p:cNvPr id="7" name="Date Placeholder 6">
-            <a:extLst>
-              <a:ext uri="{FF2B5EF4-FFF2-40B4-BE49-F238E27FC236}">
-                <a16:creationId xmlns:a16="http://schemas.microsoft.com/office/drawing/2014/main" id="{45F69D6A-822D-4DB9-A2CC-D9106F1F2B68}"/>
-              </a:ext>
-            </a:extLst>
-          </p:cNvPr>
-          <p:cNvSpPr>
-            <a:spLocks noGrp="1"/>
-          </p:cNvSpPr>
-          <p:nvPr>
-            <p:ph type="dt" sz="half" idx="10"/>
-          </p:nvPr>
-        </p:nvSpPr>
-        <p:spPr>
-          <a:xfrm>
-            <a:off x="550863" y="6507212"/>
-            <a:ext cx="2628900" cy="153888"/>
-          </a:xfrm>
-        </p:spPr>
-        <p:txBody>
-          <a:bodyPr/>
-          <a:lstStyle/>
-          <a:p>
-            <a:r>
-              <a:rPr lang="en-US"/>
-              <a:t>Tuesday, February 2, 20XX</a:t>
-            </a:r>
-            <a:endParaRPr lang="en-US" dirty="0"/>
-          </a:p>
-        </p:txBody>
-      </p:sp>
-      <p:sp>
-        <p:nvSpPr>
           <p:cNvPr id="8" name="Footer Placeholder 7">
             <a:extLst>
               <a:ext uri="{FF2B5EF4-FFF2-40B4-BE49-F238E27FC236}">
@@ -23400,40 +23332,6 @@
           </a:graphicData>
         </a:graphic>
       </p:graphicFrame>
-      <p:sp>
-        <p:nvSpPr>
-          <p:cNvPr id="2" name="Date Placeholder 1">
-            <a:extLst>
-              <a:ext uri="{FF2B5EF4-FFF2-40B4-BE49-F238E27FC236}">
-                <a16:creationId xmlns:a16="http://schemas.microsoft.com/office/drawing/2014/main" id="{81FCAF0A-629F-4EC6-B3E6-563ED999F360}"/>
-              </a:ext>
-            </a:extLst>
-          </p:cNvPr>
-          <p:cNvSpPr>
-            <a:spLocks noGrp="1"/>
-          </p:cNvSpPr>
-          <p:nvPr>
-            <p:ph type="dt" sz="half" idx="10"/>
-          </p:nvPr>
-        </p:nvSpPr>
-        <p:spPr>
-          <a:xfrm>
-            <a:off x="550863" y="6507212"/>
-            <a:ext cx="2628900" cy="153888"/>
-          </a:xfrm>
-        </p:spPr>
-        <p:txBody>
-          <a:bodyPr/>
-          <a:lstStyle/>
-          <a:p>
-            <a:r>
-              <a:rPr lang="en-US"/>
-              <a:t>Tuesday, February 2, 20XX</a:t>
-            </a:r>
-            <a:endParaRPr lang="en-US" dirty="0"/>
-          </a:p>
-        </p:txBody>
-      </p:sp>
       <p:sp>
         <p:nvSpPr>
           <p:cNvPr id="7" name="Footer Placeholder 6">
@@ -24064,40 +23962,6 @@
       </p:sp>
       <p:sp>
         <p:nvSpPr>
-          <p:cNvPr id="4" name="Date Placeholder 3">
-            <a:extLst>
-              <a:ext uri="{FF2B5EF4-FFF2-40B4-BE49-F238E27FC236}">
-                <a16:creationId xmlns:a16="http://schemas.microsoft.com/office/drawing/2014/main" id="{0C329F70-04F7-4C70-BCF8-D4371F54EF2F}"/>
-              </a:ext>
-            </a:extLst>
-          </p:cNvPr>
-          <p:cNvSpPr>
-            <a:spLocks noGrp="1"/>
-          </p:cNvSpPr>
-          <p:nvPr>
-            <p:ph type="dt" sz="half" idx="10"/>
-          </p:nvPr>
-        </p:nvSpPr>
-        <p:spPr>
-          <a:xfrm>
-            <a:off x="550863" y="6507212"/>
-            <a:ext cx="2628900" cy="153888"/>
-          </a:xfrm>
-        </p:spPr>
-        <p:txBody>
-          <a:bodyPr/>
-          <a:lstStyle/>
-          <a:p>
-            <a:r>
-              <a:rPr lang="en-US"/>
-              <a:t>Tuesday, February 2, 20XX</a:t>
-            </a:r>
-            <a:endParaRPr lang="en-US" dirty="0"/>
-          </a:p>
-        </p:txBody>
-      </p:sp>
-      <p:sp>
-        <p:nvSpPr>
           <p:cNvPr id="5" name="Footer Placeholder 4">
             <a:extLst>
               <a:ext uri="{FF2B5EF4-FFF2-40B4-BE49-F238E27FC236}">
@@ -24696,40 +24560,6 @@
       </p:sp>
       <p:sp>
         <p:nvSpPr>
-          <p:cNvPr id="14" name="Date Placeholder 13">
-            <a:extLst>
-              <a:ext uri="{FF2B5EF4-FFF2-40B4-BE49-F238E27FC236}">
-                <a16:creationId xmlns:a16="http://schemas.microsoft.com/office/drawing/2014/main" id="{D236478C-E242-44E0-8357-C72C9B588CA7}"/>
-              </a:ext>
-            </a:extLst>
-          </p:cNvPr>
-          <p:cNvSpPr>
-            <a:spLocks noGrp="1"/>
-          </p:cNvSpPr>
-          <p:nvPr>
-            <p:ph type="dt" sz="half" idx="10"/>
-          </p:nvPr>
-        </p:nvSpPr>
-        <p:spPr>
-          <a:xfrm>
-            <a:off x="550863" y="6507212"/>
-            <a:ext cx="2628900" cy="153888"/>
-          </a:xfrm>
-        </p:spPr>
-        <p:txBody>
-          <a:bodyPr/>
-          <a:lstStyle/>
-          <a:p>
-            <a:r>
-              <a:rPr lang="en-US"/>
-              <a:t>Tuesday, February 2, 20XX</a:t>
-            </a:r>
-            <a:endParaRPr lang="en-US" dirty="0"/>
-          </a:p>
-        </p:txBody>
-      </p:sp>
-      <p:sp>
-        <p:nvSpPr>
           <p:cNvPr id="15" name="Footer Placeholder 14">
             <a:extLst>
               <a:ext uri="{FF2B5EF4-FFF2-40B4-BE49-F238E27FC236}">
@@ -24943,40 +24773,6 @@
       </p:sp>
       <p:sp>
         <p:nvSpPr>
-          <p:cNvPr id="4" name="Date Placeholder 3">
-            <a:extLst>
-              <a:ext uri="{FF2B5EF4-FFF2-40B4-BE49-F238E27FC236}">
-                <a16:creationId xmlns:a16="http://schemas.microsoft.com/office/drawing/2014/main" id="{0C329F70-04F7-4C70-BCF8-D4371F54EF2F}"/>
-              </a:ext>
-            </a:extLst>
-          </p:cNvPr>
-          <p:cNvSpPr>
-            <a:spLocks noGrp="1"/>
-          </p:cNvSpPr>
-          <p:nvPr>
-            <p:ph type="dt" sz="half" idx="10"/>
-          </p:nvPr>
-        </p:nvSpPr>
-        <p:spPr>
-          <a:xfrm>
-            <a:off x="550863" y="6507212"/>
-            <a:ext cx="2628900" cy="153888"/>
-          </a:xfrm>
-        </p:spPr>
-        <p:txBody>
-          <a:bodyPr/>
-          <a:lstStyle/>
-          <a:p>
-            <a:r>
-              <a:rPr lang="en-US"/>
-              <a:t>Tuesday, February 2, 20XX</a:t>
-            </a:r>
-            <a:endParaRPr lang="en-US" dirty="0"/>
-          </a:p>
-        </p:txBody>
-      </p:sp>
-      <p:sp>
-        <p:nvSpPr>
           <p:cNvPr id="5" name="Footer Placeholder 4">
             <a:extLst>
               <a:ext uri="{FF2B5EF4-FFF2-40B4-BE49-F238E27FC236}">
@@ -25153,39 +24949,6 @@
           </a:xfrm>
         </p:spPr>
       </p:pic>
-      <p:sp>
-        <p:nvSpPr>
-          <p:cNvPr id="13" name="Date Placeholder 12">
-            <a:extLst>
-              <a:ext uri="{FF2B5EF4-FFF2-40B4-BE49-F238E27FC236}">
-                <a16:creationId xmlns:a16="http://schemas.microsoft.com/office/drawing/2014/main" id="{915FE2C5-E66A-4405-B19E-2C5C546C98E4}"/>
-              </a:ext>
-            </a:extLst>
-          </p:cNvPr>
-          <p:cNvSpPr>
-            <a:spLocks noGrp="1"/>
-          </p:cNvSpPr>
-          <p:nvPr>
-            <p:ph type="dt" sz="half" idx="10"/>
-          </p:nvPr>
-        </p:nvSpPr>
-        <p:spPr>
-          <a:xfrm>
-            <a:off x="550863" y="6507212"/>
-            <a:ext cx="2628900" cy="153888"/>
-          </a:xfrm>
-        </p:spPr>
-        <p:txBody>
-          <a:bodyPr/>
-          <a:lstStyle/>
-          <a:p>
-            <a:r>
-              <a:rPr lang="en-US"/>
-              <a:t>Tuesday, February 2, 20XX</a:t>
-            </a:r>
-          </a:p>
-        </p:txBody>
-      </p:sp>
       <p:sp>
         <p:nvSpPr>
           <p:cNvPr id="14" name="Footer Placeholder 13">
@@ -25497,39 +25260,6 @@
       </p:pic>
       <p:sp>
         <p:nvSpPr>
-          <p:cNvPr id="13" name="Date Placeholder 12">
-            <a:extLst>
-              <a:ext uri="{FF2B5EF4-FFF2-40B4-BE49-F238E27FC236}">
-                <a16:creationId xmlns:a16="http://schemas.microsoft.com/office/drawing/2014/main" id="{915FE2C5-E66A-4405-B19E-2C5C546C98E4}"/>
-              </a:ext>
-            </a:extLst>
-          </p:cNvPr>
-          <p:cNvSpPr>
-            <a:spLocks noGrp="1"/>
-          </p:cNvSpPr>
-          <p:nvPr>
-            <p:ph type="dt" sz="half" idx="10"/>
-          </p:nvPr>
-        </p:nvSpPr>
-        <p:spPr>
-          <a:xfrm>
-            <a:off x="550863" y="6507212"/>
-            <a:ext cx="2628900" cy="153888"/>
-          </a:xfrm>
-        </p:spPr>
-        <p:txBody>
-          <a:bodyPr/>
-          <a:lstStyle/>
-          <a:p>
-            <a:r>
-              <a:rPr lang="en-US"/>
-              <a:t>Tuesday, February 2, 20XX</a:t>
-            </a:r>
-          </a:p>
-        </p:txBody>
-      </p:sp>
-      <p:sp>
-        <p:nvSpPr>
           <p:cNvPr id="14" name="Footer Placeholder 13">
             <a:extLst>
               <a:ext uri="{FF2B5EF4-FFF2-40B4-BE49-F238E27FC236}">
@@ -25791,46 +25521,6 @@
             <a:r>
               <a:rPr lang="en-US" dirty="0"/>
               <a:t>Next Week</a:t>
-            </a:r>
-          </a:p>
-        </p:txBody>
-      </p:sp>
-      <p:sp>
-        <p:nvSpPr>
-          <p:cNvPr id="2" name="Date Placeholder 1">
-            <a:extLst>
-              <a:ext uri="{FF2B5EF4-FFF2-40B4-BE49-F238E27FC236}">
-                <a16:creationId xmlns:a16="http://schemas.microsoft.com/office/drawing/2014/main" id="{81FCAF0A-629F-4EC6-B3E6-563ED999F360}"/>
-              </a:ext>
-            </a:extLst>
-          </p:cNvPr>
-          <p:cNvSpPr>
-            <a:spLocks noGrp="1"/>
-          </p:cNvSpPr>
-          <p:nvPr>
-            <p:ph type="dt" sz="half" idx="10"/>
-          </p:nvPr>
-        </p:nvSpPr>
-        <p:spPr>
-          <a:xfrm>
-            <a:off x="550863" y="6507212"/>
-            <a:ext cx="2628900" cy="153888"/>
-          </a:xfrm>
-        </p:spPr>
-        <p:txBody>
-          <a:bodyPr>
-            <a:normAutofit/>
-          </a:bodyPr>
-          <a:lstStyle/>
-          <a:p>
-            <a:pPr>
-              <a:spcAft>
-                <a:spcPts val="600"/>
-              </a:spcAft>
-            </a:pPr>
-            <a:r>
-              <a:rPr lang="en-US"/>
-              <a:t>Tuesday, February 2, 20XX</a:t>
             </a:r>
           </a:p>
         </p:txBody>
@@ -26137,39 +25827,6 @@
           </a:xfrm>
         </p:spPr>
       </p:pic>
-      <p:sp>
-        <p:nvSpPr>
-          <p:cNvPr id="4" name="Date Placeholder 3">
-            <a:extLst>
-              <a:ext uri="{FF2B5EF4-FFF2-40B4-BE49-F238E27FC236}">
-                <a16:creationId xmlns:a16="http://schemas.microsoft.com/office/drawing/2014/main" id="{7823E305-6365-4345-8BD1-4A31C61D96CB}"/>
-              </a:ext>
-            </a:extLst>
-          </p:cNvPr>
-          <p:cNvSpPr>
-            <a:spLocks noGrp="1"/>
-          </p:cNvSpPr>
-          <p:nvPr>
-            <p:ph type="dt" sz="half" idx="10"/>
-          </p:nvPr>
-        </p:nvSpPr>
-        <p:spPr>
-          <a:xfrm>
-            <a:off x="550863" y="6507212"/>
-            <a:ext cx="2628900" cy="153888"/>
-          </a:xfrm>
-        </p:spPr>
-        <p:txBody>
-          <a:bodyPr/>
-          <a:lstStyle/>
-          <a:p>
-            <a:r>
-              <a:rPr lang="en-US"/>
-              <a:t>Tuesday, February 2, 20XX</a:t>
-            </a:r>
-          </a:p>
-        </p:txBody>
-      </p:sp>
       <p:sp>
         <p:nvSpPr>
           <p:cNvPr id="5" name="Footer Placeholder 4">
@@ -27452,34 +27109,6 @@
       </p:sp>
       <p:sp>
         <p:nvSpPr>
-          <p:cNvPr id="2" name="Date Placeholder 1">
-            <a:extLst>
-              <a:ext uri="{FF2B5EF4-FFF2-40B4-BE49-F238E27FC236}">
-                <a16:creationId xmlns:a16="http://schemas.microsoft.com/office/drawing/2014/main" id="{2910D835-B454-4270-BB35-86A187307E6F}"/>
-              </a:ext>
-            </a:extLst>
-          </p:cNvPr>
-          <p:cNvSpPr>
-            <a:spLocks noGrp="1"/>
-          </p:cNvSpPr>
-          <p:nvPr>
-            <p:ph type="dt" sz="half" idx="10"/>
-          </p:nvPr>
-        </p:nvSpPr>
-        <p:spPr/>
-        <p:txBody>
-          <a:bodyPr/>
-          <a:lstStyle/>
-          <a:p>
-            <a:r>
-              <a:rPr lang="en-US"/>
-              <a:t>Tuesday, February 2, 20XX</a:t>
-            </a:r>
-          </a:p>
-        </p:txBody>
-      </p:sp>
-      <p:sp>
-        <p:nvSpPr>
           <p:cNvPr id="3" name="Footer Placeholder 2">
             <a:extLst>
               <a:ext uri="{FF2B5EF4-FFF2-40B4-BE49-F238E27FC236}">
@@ -27714,40 +27343,6 @@
           </a:xfrm>
         </p:spPr>
       </p:pic>
-      <p:sp>
-        <p:nvSpPr>
-          <p:cNvPr id="4" name="Date Placeholder 3">
-            <a:extLst>
-              <a:ext uri="{FF2B5EF4-FFF2-40B4-BE49-F238E27FC236}">
-                <a16:creationId xmlns:a16="http://schemas.microsoft.com/office/drawing/2014/main" id="{0C329F70-04F7-4C70-BCF8-D4371F54EF2F}"/>
-              </a:ext>
-            </a:extLst>
-          </p:cNvPr>
-          <p:cNvSpPr>
-            <a:spLocks noGrp="1"/>
-          </p:cNvSpPr>
-          <p:nvPr>
-            <p:ph type="dt" sz="half" idx="10"/>
-          </p:nvPr>
-        </p:nvSpPr>
-        <p:spPr>
-          <a:xfrm>
-            <a:off x="550863" y="6507212"/>
-            <a:ext cx="2628900" cy="153888"/>
-          </a:xfrm>
-        </p:spPr>
-        <p:txBody>
-          <a:bodyPr/>
-          <a:lstStyle/>
-          <a:p>
-            <a:r>
-              <a:rPr lang="en-US"/>
-              <a:t>Tuesday, February 2, 20XX</a:t>
-            </a:r>
-            <a:endParaRPr lang="en-US" dirty="0"/>
-          </a:p>
-        </p:txBody>
-      </p:sp>
       <p:sp>
         <p:nvSpPr>
           <p:cNvPr id="5" name="Footer Placeholder 4">
@@ -27993,40 +27588,6 @@
           </a:graphicData>
         </a:graphic>
       </p:graphicFrame>
-      <p:sp>
-        <p:nvSpPr>
-          <p:cNvPr id="4" name="Date Placeholder 3">
-            <a:extLst>
-              <a:ext uri="{FF2B5EF4-FFF2-40B4-BE49-F238E27FC236}">
-                <a16:creationId xmlns:a16="http://schemas.microsoft.com/office/drawing/2014/main" id="{E39EF484-38C8-4EDC-ACF5-695CFB216839}"/>
-              </a:ext>
-            </a:extLst>
-          </p:cNvPr>
-          <p:cNvSpPr>
-            <a:spLocks noGrp="1"/>
-          </p:cNvSpPr>
-          <p:nvPr>
-            <p:ph type="dt" sz="half" idx="10"/>
-          </p:nvPr>
-        </p:nvSpPr>
-        <p:spPr>
-          <a:xfrm>
-            <a:off x="550863" y="6507212"/>
-            <a:ext cx="2628900" cy="153888"/>
-          </a:xfrm>
-        </p:spPr>
-        <p:txBody>
-          <a:bodyPr/>
-          <a:lstStyle/>
-          <a:p>
-            <a:r>
-              <a:rPr lang="en-US"/>
-              <a:t>Tuesday, February 2, 20XX</a:t>
-            </a:r>
-            <a:endParaRPr lang="en-US" dirty="0"/>
-          </a:p>
-        </p:txBody>
-      </p:sp>
       <p:sp>
         <p:nvSpPr>
           <p:cNvPr id="5" name="Footer Placeholder 4">
@@ -29667,39 +29228,6 @@
       </p:graphicFrame>
       <p:sp>
         <p:nvSpPr>
-          <p:cNvPr id="14" name="Date Placeholder 13">
-            <a:extLst>
-              <a:ext uri="{FF2B5EF4-FFF2-40B4-BE49-F238E27FC236}">
-                <a16:creationId xmlns:a16="http://schemas.microsoft.com/office/drawing/2014/main" id="{DC738669-5750-45EA-9715-A0041D4C569B}"/>
-              </a:ext>
-            </a:extLst>
-          </p:cNvPr>
-          <p:cNvSpPr>
-            <a:spLocks noGrp="1"/>
-          </p:cNvSpPr>
-          <p:nvPr>
-            <p:ph type="dt" sz="half" idx="10"/>
-          </p:nvPr>
-        </p:nvSpPr>
-        <p:spPr>
-          <a:xfrm>
-            <a:off x="550863" y="6507212"/>
-            <a:ext cx="2628900" cy="153888"/>
-          </a:xfrm>
-        </p:spPr>
-        <p:txBody>
-          <a:bodyPr/>
-          <a:lstStyle/>
-          <a:p>
-            <a:r>
-              <a:rPr lang="en-US"/>
-              <a:t>Tuesday, February 2, 20XX</a:t>
-            </a:r>
-          </a:p>
-        </p:txBody>
-      </p:sp>
-      <p:sp>
-        <p:nvSpPr>
           <p:cNvPr id="15" name="Footer Placeholder 14">
             <a:extLst>
               <a:ext uri="{FF2B5EF4-FFF2-40B4-BE49-F238E27FC236}">
@@ -30583,22 +30111,12 @@
 </file>
 
 <file path=customXml/item1.xml><?xml version="1.0" encoding="utf-8"?>
-<p:properties xmlns:p="http://schemas.microsoft.com/office/2006/metadata/properties" xmlns:xsi="http://www.w3.org/2001/XMLSchema-instance" xmlns:pc="http://schemas.microsoft.com/office/infopath/2007/PartnerControls">
-  <documentManagement>
-    <_ip_UnifiedCompliancePolicyUIAction xmlns="http://schemas.microsoft.com/sharepoint/v3" xsi:nil="true"/>
-    <Image xmlns="71af3243-3dd4-4a8d-8c0d-dd76da1f02a5">
-      <Url xsi:nil="true"/>
-      <Description xsi:nil="true"/>
-    </Image>
-    <Status xmlns="71af3243-3dd4-4a8d-8c0d-dd76da1f02a5">Not started</Status>
-    <_ip_UnifiedCompliancePolicyProperties xmlns="http://schemas.microsoft.com/sharepoint/v3" xsi:nil="true"/>
-    <lcf76f155ced4ddcb4097134ff3c332f xmlns="71af3243-3dd4-4a8d-8c0d-dd76da1f02a5">
-      <Terms xmlns="http://schemas.microsoft.com/office/infopath/2007/PartnerControls"/>
-    </lcf76f155ced4ddcb4097134ff3c332f>
-    <TaxCatchAll xmlns="230e9df3-be65-4c73-a93b-d1236ebd677e"/>
-    <MediaServiceKeyPoints xmlns="71af3243-3dd4-4a8d-8c0d-dd76da1f02a5" xsi:nil="true"/>
-  </documentManagement>
-</p:properties>
+<?mso-contentType ?>
+<FormTemplates xmlns="http://schemas.microsoft.com/sharepoint/v3/contenttype/forms">
+  <Display>DocumentLibraryForm</Display>
+  <Edit>DocumentLibraryForm</Edit>
+  <New>DocumentLibraryForm</New>
+</FormTemplates>
 </file>
 
 <file path=customXml/item2.xml><?xml version="1.0" encoding="utf-8"?>
@@ -30878,22 +30396,28 @@
 </file>
 
 <file path=customXml/item3.xml><?xml version="1.0" encoding="utf-8"?>
-<?mso-contentType ?>
-<FormTemplates xmlns="http://schemas.microsoft.com/sharepoint/v3/contenttype/forms">
-  <Display>DocumentLibraryForm</Display>
-  <Edit>DocumentLibraryForm</Edit>
-  <New>DocumentLibraryForm</New>
-</FormTemplates>
+<p:properties xmlns:p="http://schemas.microsoft.com/office/2006/metadata/properties" xmlns:xsi="http://www.w3.org/2001/XMLSchema-instance" xmlns:pc="http://schemas.microsoft.com/office/infopath/2007/PartnerControls">
+  <documentManagement>
+    <_ip_UnifiedCompliancePolicyUIAction xmlns="http://schemas.microsoft.com/sharepoint/v3" xsi:nil="true"/>
+    <Image xmlns="71af3243-3dd4-4a8d-8c0d-dd76da1f02a5">
+      <Url xsi:nil="true"/>
+      <Description xsi:nil="true"/>
+    </Image>
+    <Status xmlns="71af3243-3dd4-4a8d-8c0d-dd76da1f02a5">Not started</Status>
+    <_ip_UnifiedCompliancePolicyProperties xmlns="http://schemas.microsoft.com/sharepoint/v3" xsi:nil="true"/>
+    <lcf76f155ced4ddcb4097134ff3c332f xmlns="71af3243-3dd4-4a8d-8c0d-dd76da1f02a5">
+      <Terms xmlns="http://schemas.microsoft.com/office/infopath/2007/PartnerControls"/>
+    </lcf76f155ced4ddcb4097134ff3c332f>
+    <TaxCatchAll xmlns="230e9df3-be65-4c73-a93b-d1236ebd677e"/>
+    <MediaServiceKeyPoints xmlns="71af3243-3dd4-4a8d-8c0d-dd76da1f02a5" xsi:nil="true"/>
+  </documentManagement>
+</p:properties>
 </file>
 
 <file path=customXml/itemProps1.xml><?xml version="1.0" encoding="utf-8"?>
-<ds:datastoreItem xmlns:ds="http://schemas.openxmlformats.org/officeDocument/2006/customXml" ds:itemID="{50811A92-D464-4AC4-A396-BA73B10CEEAC}">
+<ds:datastoreItem xmlns:ds="http://schemas.openxmlformats.org/officeDocument/2006/customXml" ds:itemID="{904751AB-E840-446F-8D49-E697067EC887}">
   <ds:schemaRefs>
-    <ds:schemaRef ds:uri="http://schemas.microsoft.com/office/2006/metadata/properties"/>
-    <ds:schemaRef ds:uri="http://schemas.microsoft.com/office/infopath/2007/PartnerControls"/>
-    <ds:schemaRef ds:uri="http://schemas.microsoft.com/sharepoint/v3"/>
-    <ds:schemaRef ds:uri="71af3243-3dd4-4a8d-8c0d-dd76da1f02a5"/>
-    <ds:schemaRef ds:uri="230e9df3-be65-4c73-a93b-d1236ebd677e"/>
+    <ds:schemaRef ds:uri="http://schemas.microsoft.com/sharepoint/v3/contenttype/forms"/>
   </ds:schemaRefs>
 </ds:datastoreItem>
 </file>
@@ -30920,9 +30444,13 @@
 </file>
 
 <file path=customXml/itemProps3.xml><?xml version="1.0" encoding="utf-8"?>
-<ds:datastoreItem xmlns:ds="http://schemas.openxmlformats.org/officeDocument/2006/customXml" ds:itemID="{904751AB-E840-446F-8D49-E697067EC887}">
+<ds:datastoreItem xmlns:ds="http://schemas.openxmlformats.org/officeDocument/2006/customXml" ds:itemID="{50811A92-D464-4AC4-A396-BA73B10CEEAC}">
   <ds:schemaRefs>
-    <ds:schemaRef ds:uri="http://schemas.microsoft.com/sharepoint/v3/contenttype/forms"/>
+    <ds:schemaRef ds:uri="http://schemas.microsoft.com/office/2006/metadata/properties"/>
+    <ds:schemaRef ds:uri="http://schemas.microsoft.com/office/infopath/2007/PartnerControls"/>
+    <ds:schemaRef ds:uri="http://schemas.microsoft.com/sharepoint/v3"/>
+    <ds:schemaRef ds:uri="71af3243-3dd4-4a8d-8c0d-dd76da1f02a5"/>
+    <ds:schemaRef ds:uri="230e9df3-be65-4c73-a93b-d1236ebd677e"/>
   </ds:schemaRefs>
 </ds:datastoreItem>
 </file>

</xml_diff>